<commit_message>
Updated pptx for A3
</commit_message>
<xml_diff>
--- a/ENSF 607/Assignment 3/documents/Ticket Dashboard Presentation.pptx
+++ b/ENSF 607/Assignment 3/documents/Ticket Dashboard Presentation.pptx
@@ -12,8 +12,6 @@
     <p:sldId id="262" r:id="rId6"/>
     <p:sldId id="263" r:id="rId7"/>
     <p:sldId id="264" r:id="rId8"/>
-    <p:sldId id="258" r:id="rId9"/>
-    <p:sldId id="259" r:id="rId10"/>
   </p:sldIdLst>
   <p:sldSz cx="12192000" cy="6858000"/>
   <p:notesSz cx="6858000" cy="9144000"/>
@@ -286,7 +284,7 @@
             <a:fld id="{3F9AFA87-1417-4992-ABD9-27C3BC8CC883}" type="datetimeFigureOut">
               <a:rPr lang="en-US" smtClean="0"/>
               <a:pPr algn="r"/>
-              <a:t>10/19/2023</a:t>
+              <a:t>10/19/23</a:t>
             </a:fld>
             <a:endParaRPr lang="en-US" dirty="0"/>
           </a:p>
@@ -487,7 +485,7 @@
           <a:p>
             <a:fld id="{3F9AFA87-1417-4992-ABD9-27C3BC8CC883}" type="datetimeFigureOut">
               <a:rPr lang="en-US" smtClean="0"/>
-              <a:t>10/19/2023</a:t>
+              <a:t>10/19/23</a:t>
             </a:fld>
             <a:endParaRPr lang="en-US"/>
           </a:p>
@@ -697,7 +695,7 @@
           <a:p>
             <a:fld id="{3F9AFA87-1417-4992-ABD9-27C3BC8CC883}" type="datetimeFigureOut">
               <a:rPr lang="en-US" smtClean="0"/>
-              <a:t>10/19/2023</a:t>
+              <a:t>10/19/23</a:t>
             </a:fld>
             <a:endParaRPr lang="en-US"/>
           </a:p>
@@ -895,7 +893,7 @@
           <a:p>
             <a:fld id="{3F9AFA87-1417-4992-ABD9-27C3BC8CC883}" type="datetimeFigureOut">
               <a:rPr lang="en-US" smtClean="0"/>
-              <a:t>10/19/2023</a:t>
+              <a:t>10/19/23</a:t>
             </a:fld>
             <a:endParaRPr lang="en-US"/>
           </a:p>
@@ -1169,7 +1167,7 @@
           <a:p>
             <a:fld id="{3F9AFA87-1417-4992-ABD9-27C3BC8CC883}" type="datetimeFigureOut">
               <a:rPr lang="en-US" smtClean="0"/>
-              <a:t>10/19/2023</a:t>
+              <a:t>10/19/23</a:t>
             </a:fld>
             <a:endParaRPr lang="en-US"/>
           </a:p>
@@ -1434,7 +1432,7 @@
           <a:p>
             <a:fld id="{3F9AFA87-1417-4992-ABD9-27C3BC8CC883}" type="datetimeFigureOut">
               <a:rPr lang="en-US" smtClean="0"/>
-              <a:t>10/19/2023</a:t>
+              <a:t>10/19/23</a:t>
             </a:fld>
             <a:endParaRPr lang="en-US" dirty="0"/>
           </a:p>
@@ -1821,7 +1819,7 @@
           <a:p>
             <a:fld id="{3F9AFA87-1417-4992-ABD9-27C3BC8CC883}" type="datetimeFigureOut">
               <a:rPr lang="en-US" smtClean="0"/>
-              <a:t>10/19/2023</a:t>
+              <a:t>10/19/23</a:t>
             </a:fld>
             <a:endParaRPr lang="en-US"/>
           </a:p>
@@ -1991,7 +1989,7 @@
           <a:p>
             <a:fld id="{3F9AFA87-1417-4992-ABD9-27C3BC8CC883}" type="datetimeFigureOut">
               <a:rPr lang="en-US" smtClean="0"/>
-              <a:t>10/19/2023</a:t>
+              <a:t>10/19/23</a:t>
             </a:fld>
             <a:endParaRPr lang="en-US"/>
           </a:p>
@@ -2104,7 +2102,7 @@
           <a:p>
             <a:fld id="{3F9AFA87-1417-4992-ABD9-27C3BC8CC883}" type="datetimeFigureOut">
               <a:rPr lang="en-US" smtClean="0"/>
-              <a:t>10/19/2023</a:t>
+              <a:t>10/19/23</a:t>
             </a:fld>
             <a:endParaRPr lang="en-US"/>
           </a:p>
@@ -2424,7 +2422,7 @@
           <a:p>
             <a:fld id="{3F9AFA87-1417-4992-ABD9-27C3BC8CC883}" type="datetimeFigureOut">
               <a:rPr lang="en-US" smtClean="0"/>
-              <a:t>10/19/2023</a:t>
+              <a:t>10/19/23</a:t>
             </a:fld>
             <a:endParaRPr lang="en-US"/>
           </a:p>
@@ -2729,7 +2727,7 @@
           <a:p>
             <a:fld id="{3F9AFA87-1417-4992-ABD9-27C3BC8CC883}" type="datetimeFigureOut">
               <a:rPr lang="en-US" smtClean="0"/>
-              <a:t>10/19/2023</a:t>
+              <a:t>10/19/23</a:t>
             </a:fld>
             <a:endParaRPr lang="en-US"/>
           </a:p>
@@ -2972,7 +2970,7 @@
             <a:fld id="{3F9AFA87-1417-4992-ABD9-27C3BC8CC883}" type="datetimeFigureOut">
               <a:rPr lang="en-US" smtClean="0"/>
               <a:pPr algn="r"/>
-              <a:t>10/19/2023</a:t>
+              <a:t>10/19/23</a:t>
             </a:fld>
             <a:endParaRPr lang="en-US" dirty="0"/>
           </a:p>
@@ -3652,6 +3650,31 @@
               <a:rPr lang="en-CA" sz="4800" dirty="0"/>
               <a:t>ENSF 607 Ticket Dashboards</a:t>
             </a:r>
+            <a:br>
+              <a:rPr lang="en-CA" sz="4800" dirty="0"/>
+            </a:br>
+            <a:br>
+              <a:rPr lang="en-CA" sz="4800" dirty="0"/>
+            </a:br>
+            <a:r>
+              <a:rPr lang="en-CA" sz="1800" b="1" dirty="0"/>
+              <a:t>Chioma Ukaegbu </a:t>
+            </a:r>
+            <a:br>
+              <a:rPr lang="en-CA" sz="1800" b="1" dirty="0"/>
+            </a:br>
+            <a:r>
+              <a:rPr lang="en-CA" sz="1800" b="1" dirty="0"/>
+              <a:t>Christian Valdez</a:t>
+            </a:r>
+            <a:br>
+              <a:rPr lang="en-CA" sz="1800" b="1" dirty="0"/>
+            </a:br>
+            <a:r>
+              <a:rPr lang="en-CA" sz="1800" b="1" dirty="0"/>
+              <a:t>Redge Santillan</a:t>
+            </a:r>
+            <a:endParaRPr lang="en-CA" sz="4800" b="1" dirty="0"/>
           </a:p>
         </p:txBody>
       </p:sp>
@@ -3688,6 +3711,10 @@
               <a:rPr lang="en-CA" dirty="0"/>
               <a:t>From January 1, 2023 to June 30, 2023</a:t>
             </a:r>
+          </a:p>
+          <a:p>
+            <a:pPr algn="l"/>
+            <a:endParaRPr lang="en-CA" dirty="0"/>
           </a:p>
         </p:txBody>
       </p:sp>
@@ -4219,13 +4246,13 @@
   <p:clrMapOvr>
     <a:masterClrMapping/>
   </p:clrMapOvr>
-  <mc:AlternateContent xmlns:mc="http://schemas.openxmlformats.org/markup-compatibility/2006">
-    <mc:Choice xmlns:p159="http://schemas.microsoft.com/office/powerpoint/2015/09/main" Requires="p159">
+  <mc:AlternateContent xmlns:mc="http://schemas.openxmlformats.org/markup-compatibility/2006" xmlns:p159="http://schemas.microsoft.com/office/powerpoint/2015/09/main">
+    <mc:Choice Requires="p159">
       <p:transition xmlns:p14="http://schemas.microsoft.com/office/powerpoint/2010/main" spd="slow" p14:dur="2000">
         <p159:morph option="byObject"/>
       </p:transition>
     </mc:Choice>
-    <mc:Fallback>
+    <mc:Fallback xmlns="">
       <p:transition spd="slow">
         <p:fade/>
       </p:transition>
@@ -4570,13 +4597,13 @@
                   <a:srgbClr val="000000"/>
                 </a:solidFill>
                 <a:effectLst/>
-                <a:latin typeface="Avenir Next LT Pro (Body)"/>
+                <a:latin typeface="Avenir Next" panose="020B0503020202020204" pitchFamily="34" charset="0"/>
               </a:rPr>
               <a:t>While "Deployed" tickets peaked in March and then decreased, "Deployed Failed" tickets had their highest count in February, with a consistent drop-off towards June.</a:t>
             </a:r>
             <a:endParaRPr lang="en-US" b="0" dirty="0">
               <a:effectLst/>
-              <a:latin typeface="Avenir Next LT Pro (Body)"/>
+              <a:latin typeface="Avenir Next" panose="020B0503020202020204" pitchFamily="34" charset="0"/>
             </a:endParaRPr>
           </a:p>
         </p:txBody>
@@ -4591,13 +4618,13 @@
   <p:clrMapOvr>
     <a:masterClrMapping/>
   </p:clrMapOvr>
-  <mc:AlternateContent xmlns:mc="http://schemas.openxmlformats.org/markup-compatibility/2006">
-    <mc:Choice xmlns:p159="http://schemas.microsoft.com/office/powerpoint/2015/09/main" Requires="p159">
+  <mc:AlternateContent xmlns:mc="http://schemas.openxmlformats.org/markup-compatibility/2006" xmlns:p159="http://schemas.microsoft.com/office/powerpoint/2015/09/main">
+    <mc:Choice Requires="p159">
       <p:transition xmlns:p14="http://schemas.microsoft.com/office/powerpoint/2010/main" spd="slow" p14:dur="2000">
         <p159:morph option="byObject"/>
       </p:transition>
     </mc:Choice>
-    <mc:Fallback>
+    <mc:Fallback xmlns="">
       <p:transition spd="slow">
         <p:fade/>
       </p:transition>
@@ -4894,12 +4921,13 @@
                   <a:srgbClr val="000000"/>
                 </a:solidFill>
                 <a:effectLst/>
-                <a:latin typeface="Calibri" panose="020F0502020204030204" pitchFamily="34" charset="0"/>
+                <a:latin typeface="Avenir Next" panose="020B0503020202020204" pitchFamily="34" charset="0"/>
               </a:rPr>
               <a:t>Overall, the ticket distribution is balanced across classes. Change tickets show a declining trend, while SRs peaked in April. Incidents and Problems remain consistent.</a:t>
             </a:r>
             <a:endParaRPr lang="en-US" b="0" dirty="0">
               <a:effectLst/>
+              <a:latin typeface="Avenir Next" panose="020B0503020202020204" pitchFamily="34" charset="0"/>
             </a:endParaRPr>
           </a:p>
         </p:txBody>
@@ -4965,7 +4993,7 @@
         <p:spPr>
           <a:xfrm>
             <a:off x="0" y="5174162"/>
-            <a:ext cx="6096000" cy="1477328"/>
+            <a:ext cx="6096000" cy="1754326"/>
           </a:xfrm>
           <a:prstGeom prst="rect">
             <a:avLst/>
@@ -4994,7 +5022,7 @@
                   <a:srgbClr val="000000"/>
                 </a:solidFill>
                 <a:effectLst/>
-                <a:latin typeface="Calibri" panose="020F0502020204030204" pitchFamily="34" charset="0"/>
+                <a:latin typeface="Avenir Next" panose="020B0503020202020204" pitchFamily="34" charset="0"/>
               </a:rPr>
               <a:t>Change Tickets: Peak in January (461), lowest in June (371).</a:t>
             </a:r>
@@ -5016,7 +5044,7 @@
                   <a:srgbClr val="000000"/>
                 </a:solidFill>
                 <a:effectLst/>
-                <a:latin typeface="Calibri" panose="020F0502020204030204" pitchFamily="34" charset="0"/>
+                <a:latin typeface="Avenir Next" panose="020B0503020202020204" pitchFamily="34" charset="0"/>
               </a:rPr>
               <a:t>SR Tickets: Highest in April (432), moderate decrease by June (407).</a:t>
             </a:r>
@@ -5038,7 +5066,7 @@
                   <a:srgbClr val="000000"/>
                 </a:solidFill>
                 <a:effectLst/>
-                <a:latin typeface="Calibri" panose="020F0502020204030204" pitchFamily="34" charset="0"/>
+                <a:latin typeface="Avenir Next" panose="020B0503020202020204" pitchFamily="34" charset="0"/>
               </a:rPr>
               <a:t>Incident &amp; Problem Tickets: Relatively stable counts, minor fluctuations.</a:t>
             </a:r>
@@ -5346,12 +5374,13 @@
                   <a:srgbClr val="000000"/>
                 </a:solidFill>
                 <a:effectLst/>
-                <a:latin typeface="Calibri" panose="020F0502020204030204" pitchFamily="34" charset="0"/>
+                <a:latin typeface="Avenir Next" panose="020B0503020202020204" pitchFamily="34" charset="0"/>
               </a:rPr>
               <a:t>Across all ticket classes, the time taken to resolve issues has improved significantly over the six months, indicating more efficient resolution processes or fewer complexities encountered in recent months.</a:t>
             </a:r>
             <a:endParaRPr lang="en-US" b="0" dirty="0">
               <a:effectLst/>
+              <a:latin typeface="Avenir Next" panose="020B0503020202020204" pitchFamily="34" charset="0"/>
             </a:endParaRPr>
           </a:p>
         </p:txBody>
@@ -5371,7 +5400,7 @@
         <p:spPr>
           <a:xfrm>
             <a:off x="176463" y="5505359"/>
-            <a:ext cx="6096000" cy="1200329"/>
+            <a:ext cx="6096000" cy="1477328"/>
           </a:xfrm>
           <a:prstGeom prst="rect">
             <a:avLst/>
@@ -5398,12 +5427,13 @@
                   <a:srgbClr val="000000"/>
                 </a:solidFill>
                 <a:effectLst/>
-                <a:latin typeface="Calibri" panose="020F0502020204030204" pitchFamily="34" charset="0"/>
+                <a:latin typeface="Avenir Next" panose="020B0503020202020204" pitchFamily="34" charset="0"/>
               </a:rPr>
               <a:t>All ticket classes (Change, Incident, Problem, SR) have shown a consistent decline in MTTR from January to June.</a:t>
             </a:r>
             <a:endParaRPr lang="en-US" b="0" dirty="0">
               <a:effectLst/>
+              <a:latin typeface="Avenir Next" panose="020B0503020202020204" pitchFamily="34" charset="0"/>
             </a:endParaRPr>
           </a:p>
           <a:p>
@@ -5423,7 +5453,7 @@
                   <a:srgbClr val="000000"/>
                 </a:solidFill>
                 <a:effectLst/>
-                <a:latin typeface="Calibri" panose="020F0502020204030204" pitchFamily="34" charset="0"/>
+                <a:latin typeface="Avenir Next" panose="020B0503020202020204" pitchFamily="34" charset="0"/>
               </a:rPr>
               <a:t>The lines for all classes overlap closely, indicating similar resolution times for each class.</a:t>
             </a:r>
@@ -5751,7 +5781,7 @@
         <p:spPr>
           <a:xfrm>
             <a:off x="6184233" y="5690025"/>
-            <a:ext cx="6096000" cy="923330"/>
+            <a:ext cx="6096000" cy="1200329"/>
           </a:xfrm>
           <a:prstGeom prst="rect">
             <a:avLst/>
@@ -5778,12 +5808,13 @@
                   <a:srgbClr val="000000"/>
                 </a:solidFill>
                 <a:effectLst/>
-                <a:latin typeface="Calibri" panose="020F0502020204030204" pitchFamily="34" charset="0"/>
+                <a:latin typeface="Avenir Next" panose="020B0503020202020204" pitchFamily="34" charset="0"/>
               </a:rPr>
               <a:t>Overall, the priority 2 tickets have shown a notable rise, peaking in May. Priority 5 tickets saw a consistent decline. The rest maintained a consistent trend across the six months.</a:t>
             </a:r>
             <a:endParaRPr lang="en-US" b="0" dirty="0">
               <a:effectLst/>
+              <a:latin typeface="Avenir Next" panose="020B0503020202020204" pitchFamily="34" charset="0"/>
             </a:endParaRPr>
           </a:p>
         </p:txBody>
@@ -5830,7 +5861,7 @@
                   <a:srgbClr val="000000"/>
                 </a:solidFill>
                 <a:effectLst/>
-                <a:latin typeface="Calibri" panose="020F0502020204030204" pitchFamily="34" charset="0"/>
+                <a:latin typeface="Avenir Next" panose="020B0503020202020204" pitchFamily="34" charset="0"/>
               </a:rPr>
               <a:t>We decided to explore the count of priority by month from January to June.</a:t>
             </a:r>
@@ -6158,7 +6189,7 @@
         <p:spPr>
           <a:xfrm>
             <a:off x="6184233" y="5690025"/>
-            <a:ext cx="6096000" cy="923330"/>
+            <a:ext cx="6096000" cy="1200329"/>
           </a:xfrm>
           <a:prstGeom prst="rect">
             <a:avLst/>
@@ -6185,12 +6216,13 @@
                   <a:srgbClr val="000000"/>
                 </a:solidFill>
                 <a:effectLst/>
-                <a:latin typeface="Calibri" panose="020F0502020204030204" pitchFamily="34" charset="0"/>
+                <a:latin typeface="Avenir Next" panose="020B0503020202020204" pitchFamily="34" charset="0"/>
               </a:rPr>
               <a:t>The ticket distribution among the holders is balanced, with each individual managing roughly one-fifth of the total tickets. George E. has the highest count, but the difference is minimal.</a:t>
             </a:r>
             <a:endParaRPr lang="en-US" b="0" dirty="0">
               <a:effectLst/>
+              <a:latin typeface="Avenir Next" panose="020B0503020202020204" pitchFamily="34" charset="0"/>
             </a:endParaRPr>
           </a:p>
         </p:txBody>
@@ -6237,7 +6269,7 @@
                   <a:srgbClr val="000000"/>
                 </a:solidFill>
                 <a:effectLst/>
-                <a:latin typeface="Calibri" panose="020F0502020204030204" pitchFamily="34" charset="0"/>
+                <a:latin typeface="Avenir Next" panose="020B0503020202020204" pitchFamily="34" charset="0"/>
               </a:rPr>
               <a:t>Another exploratory trend we explored was the distribution of ticket holders among the five individuals.</a:t>
             </a:r>
@@ -6295,212 +6327,6 @@
     <p:extLst>
       <p:ext uri="{BB962C8B-B14F-4D97-AF65-F5344CB8AC3E}">
         <p14:creationId xmlns:p14="http://schemas.microsoft.com/office/powerpoint/2010/main" val="3867676928"/>
-      </p:ext>
-    </p:extLst>
-  </p:cSld>
-  <p:clrMapOvr>
-    <a:masterClrMapping/>
-  </p:clrMapOvr>
-</p:sld>
-</file>
-
-<file path=ppt/slides/slide8.xml><?xml version="1.0" encoding="utf-8"?>
-<p:sld xmlns:a="http://schemas.openxmlformats.org/drawingml/2006/main" xmlns:r="http://schemas.openxmlformats.org/officeDocument/2006/relationships" xmlns:p="http://schemas.openxmlformats.org/presentationml/2006/main">
-  <p:cSld>
-    <p:spTree>
-      <p:nvGrpSpPr>
-        <p:cNvPr id="1" name=""/>
-        <p:cNvGrpSpPr/>
-        <p:nvPr/>
-      </p:nvGrpSpPr>
-      <p:grpSpPr>
-        <a:xfrm>
-          <a:off x="0" y="0"/>
-          <a:ext cx="0" cy="0"/>
-          <a:chOff x="0" y="0"/>
-          <a:chExt cx="0" cy="0"/>
-        </a:xfrm>
-      </p:grpSpPr>
-      <p:sp>
-        <p:nvSpPr>
-          <p:cNvPr id="2" name="Title 1">
-            <a:extLst>
-              <a:ext uri="{FF2B5EF4-FFF2-40B4-BE49-F238E27FC236}">
-                <a16:creationId xmlns:a16="http://schemas.microsoft.com/office/drawing/2014/main" id="{277D3CE1-B520-DC9F-219E-696291184B63}"/>
-              </a:ext>
-            </a:extLst>
-          </p:cNvPr>
-          <p:cNvSpPr>
-            <a:spLocks noGrp="1"/>
-          </p:cNvSpPr>
-          <p:nvPr>
-            <p:ph type="title"/>
-          </p:nvPr>
-        </p:nvSpPr>
-        <p:spPr/>
-        <p:txBody>
-          <a:bodyPr/>
-          <a:lstStyle/>
-          <a:p>
-            <a:endParaRPr lang="en-CA"/>
-          </a:p>
-        </p:txBody>
-      </p:sp>
-      <p:sp>
-        <p:nvSpPr>
-          <p:cNvPr id="4" name="Content Placeholder 3">
-            <a:extLst>
-              <a:ext uri="{FF2B5EF4-FFF2-40B4-BE49-F238E27FC236}">
-                <a16:creationId xmlns:a16="http://schemas.microsoft.com/office/drawing/2014/main" id="{A664F5E0-1C93-156A-04EC-8DB0DDD11597}"/>
-              </a:ext>
-            </a:extLst>
-          </p:cNvPr>
-          <p:cNvSpPr>
-            <a:spLocks noGrp="1"/>
-          </p:cNvSpPr>
-          <p:nvPr>
-            <p:ph idx="1"/>
-          </p:nvPr>
-        </p:nvSpPr>
-        <p:spPr/>
-        <p:txBody>
-          <a:bodyPr/>
-          <a:lstStyle/>
-          <a:p>
-            <a:endParaRPr lang="en-CA"/>
-          </a:p>
-        </p:txBody>
-      </p:sp>
-      <p:pic>
-        <p:nvPicPr>
-          <p:cNvPr id="5" name="Picture 2">
-            <a:extLst>
-              <a:ext uri="{FF2B5EF4-FFF2-40B4-BE49-F238E27FC236}">
-                <a16:creationId xmlns:a16="http://schemas.microsoft.com/office/drawing/2014/main" id="{C190E34C-B6F8-A346-8A25-259534C634F9}"/>
-              </a:ext>
-            </a:extLst>
-          </p:cNvPr>
-          <p:cNvPicPr>
-            <a:picLocks noChangeAspect="1" noChangeArrowheads="1"/>
-          </p:cNvPicPr>
-          <p:nvPr/>
-        </p:nvPicPr>
-        <p:blipFill>
-          <a:blip r:embed="rId2">
-            <a:extLst>
-              <a:ext uri="{28A0092B-C50C-407E-A947-70E740481C1C}">
-                <a14:useLocalDpi xmlns:a14="http://schemas.microsoft.com/office/drawing/2010/main" val="0"/>
-              </a:ext>
-            </a:extLst>
-          </a:blip>
-          <a:stretch>
-            <a:fillRect/>
-          </a:stretch>
-        </p:blipFill>
-        <p:spPr bwMode="auto">
-          <a:xfrm>
-            <a:off x="2627784" y="2862072"/>
-            <a:ext cx="6035826" cy="3530956"/>
-          </a:xfrm>
-          <a:prstGeom prst="rect">
-            <a:avLst/>
-          </a:prstGeom>
-          <a:noFill/>
-          <a:extLst>
-            <a:ext uri="{909E8E84-426E-40DD-AFC4-6F175D3DCCD1}">
-              <a14:hiddenFill xmlns:a14="http://schemas.microsoft.com/office/drawing/2010/main">
-                <a:solidFill>
-                  <a:srgbClr val="FFFFFF"/>
-                </a:solidFill>
-              </a14:hiddenFill>
-            </a:ext>
-          </a:extLst>
-        </p:spPr>
-      </p:pic>
-    </p:spTree>
-    <p:extLst>
-      <p:ext uri="{BB962C8B-B14F-4D97-AF65-F5344CB8AC3E}">
-        <p14:creationId xmlns:p14="http://schemas.microsoft.com/office/powerpoint/2010/main" val="2186653379"/>
-      </p:ext>
-    </p:extLst>
-  </p:cSld>
-  <p:clrMapOvr>
-    <a:masterClrMapping/>
-  </p:clrMapOvr>
-</p:sld>
-</file>
-
-<file path=ppt/slides/slide9.xml><?xml version="1.0" encoding="utf-8"?>
-<p:sld xmlns:a="http://schemas.openxmlformats.org/drawingml/2006/main" xmlns:r="http://schemas.openxmlformats.org/officeDocument/2006/relationships" xmlns:p="http://schemas.openxmlformats.org/presentationml/2006/main">
-  <p:cSld>
-    <p:spTree>
-      <p:nvGrpSpPr>
-        <p:cNvPr id="1" name=""/>
-        <p:cNvGrpSpPr/>
-        <p:nvPr/>
-      </p:nvGrpSpPr>
-      <p:grpSpPr>
-        <a:xfrm>
-          <a:off x="0" y="0"/>
-          <a:ext cx="0" cy="0"/>
-          <a:chOff x="0" y="0"/>
-          <a:chExt cx="0" cy="0"/>
-        </a:xfrm>
-      </p:grpSpPr>
-      <p:sp>
-        <p:nvSpPr>
-          <p:cNvPr id="2" name="Title 1">
-            <a:extLst>
-              <a:ext uri="{FF2B5EF4-FFF2-40B4-BE49-F238E27FC236}">
-                <a16:creationId xmlns:a16="http://schemas.microsoft.com/office/drawing/2014/main" id="{EE6E51A9-3433-3AA5-5CF6-D5508ADA238E}"/>
-              </a:ext>
-            </a:extLst>
-          </p:cNvPr>
-          <p:cNvSpPr>
-            <a:spLocks noGrp="1"/>
-          </p:cNvSpPr>
-          <p:nvPr>
-            <p:ph type="title"/>
-          </p:nvPr>
-        </p:nvSpPr>
-        <p:spPr/>
-        <p:txBody>
-          <a:bodyPr/>
-          <a:lstStyle/>
-          <a:p>
-            <a:endParaRPr lang="en-CA"/>
-          </a:p>
-        </p:txBody>
-      </p:sp>
-      <p:sp>
-        <p:nvSpPr>
-          <p:cNvPr id="3" name="Content Placeholder 2">
-            <a:extLst>
-              <a:ext uri="{FF2B5EF4-FFF2-40B4-BE49-F238E27FC236}">
-                <a16:creationId xmlns:a16="http://schemas.microsoft.com/office/drawing/2014/main" id="{08239898-7853-CBC9-30B5-743F2C2B79C3}"/>
-              </a:ext>
-            </a:extLst>
-          </p:cNvPr>
-          <p:cNvSpPr>
-            <a:spLocks noGrp="1"/>
-          </p:cNvSpPr>
-          <p:nvPr>
-            <p:ph idx="1"/>
-          </p:nvPr>
-        </p:nvSpPr>
-        <p:spPr/>
-        <p:txBody>
-          <a:bodyPr/>
-          <a:lstStyle/>
-          <a:p>
-            <a:endParaRPr lang="en-CA"/>
-          </a:p>
-        </p:txBody>
-      </p:sp>
-    </p:spTree>
-    <p:extLst>
-      <p:ext uri="{BB962C8B-B14F-4D97-AF65-F5344CB8AC3E}">
-        <p14:creationId xmlns:p14="http://schemas.microsoft.com/office/powerpoint/2010/main" val="368110594"/>
       </p:ext>
     </p:extLst>
   </p:cSld>

</xml_diff>